<commit_message>
wrote some stuff editted the prez
</commit_message>
<xml_diff>
--- a/Pollinator abundance survey.pptx
+++ b/Pollinator abundance survey.pptx
@@ -709,6 +709,111 @@
           <a:p>
             <a:r>
               <a:rPr lang="en-US" dirty="0"/>
+              <a:t>Surveys monitored pollinator visits to flowers along a four meter transect for two 10-minute intervals per observer</a:t>
+            </a:r>
+          </a:p>
+          <a:p>
+            <a:r>
+              <a:rPr lang="en-US" dirty="0"/>
+              <a:t>Visit counts are based on number of flowers an individual pollinator visits</a:t>
+            </a:r>
+          </a:p>
+          <a:p>
+            <a:r>
+              <a:rPr lang="en-US" dirty="0"/>
+              <a:t>A total of 38 observations of 1136 pollination visits by Honeybees, Flies, Wasps, Bumble and Carpenter bees, Small bees, Small butterflies, Large butterflies, beetles, and ants</a:t>
+            </a:r>
+          </a:p>
+          <a:p>
+            <a:endParaRPr lang="en-US" dirty="0"/>
+          </a:p>
+          <a:p>
+            <a:endParaRPr lang="en-US" dirty="0"/>
+          </a:p>
+        </p:txBody>
+      </p:sp>
+      <p:sp>
+        <p:nvSpPr>
+          <p:cNvPr id="4" name="Slide Number Placeholder 3"/>
+          <p:cNvSpPr>
+            <a:spLocks noGrp="1"/>
+          </p:cNvSpPr>
+          <p:nvPr>
+            <p:ph type="sldNum" sz="quarter" idx="5"/>
+          </p:nvPr>
+        </p:nvSpPr>
+        <p:spPr/>
+        <p:txBody>
+          <a:bodyPr/>
+          <a:lstStyle/>
+          <a:p>
+            <a:fld id="{22289C57-55D7-40A4-A101-E74FAC7A092B}" type="slidenum">
+              <a:rPr lang="en-US" smtClean="0"/>
+              <a:t>2</a:t>
+            </a:fld>
+            <a:endParaRPr lang="en-US" dirty="0"/>
+          </a:p>
+        </p:txBody>
+      </p:sp>
+    </p:spTree>
+    <p:extLst>
+      <p:ext uri="{BB962C8B-B14F-4D97-AF65-F5344CB8AC3E}">
+        <p14:creationId xmlns:p14="http://schemas.microsoft.com/office/powerpoint/2010/main" val="2773911244"/>
+      </p:ext>
+    </p:extLst>
+  </p:cSld>
+  <p:clrMapOvr>
+    <a:masterClrMapping/>
+  </p:clrMapOvr>
+</p:notes>
+</file>
+
+<file path=ppt/notesSlides/notesSlide2.xml><?xml version="1.0" encoding="utf-8"?>
+<p:notes xmlns:a="http://schemas.openxmlformats.org/drawingml/2006/main" xmlns:r="http://schemas.openxmlformats.org/officeDocument/2006/relationships" xmlns:p="http://schemas.openxmlformats.org/presentationml/2006/main">
+  <p:cSld>
+    <p:spTree>
+      <p:nvGrpSpPr>
+        <p:cNvPr id="1" name=""/>
+        <p:cNvGrpSpPr/>
+        <p:nvPr/>
+      </p:nvGrpSpPr>
+      <p:grpSpPr>
+        <a:xfrm>
+          <a:off x="0" y="0"/>
+          <a:ext cx="0" cy="0"/>
+          <a:chOff x="0" y="0"/>
+          <a:chExt cx="0" cy="0"/>
+        </a:xfrm>
+      </p:grpSpPr>
+      <p:sp>
+        <p:nvSpPr>
+          <p:cNvPr id="2" name="Slide Image Placeholder 1"/>
+          <p:cNvSpPr>
+            <a:spLocks noGrp="1" noRot="1" noChangeAspect="1"/>
+          </p:cNvSpPr>
+          <p:nvPr>
+            <p:ph type="sldImg"/>
+          </p:nvPr>
+        </p:nvSpPr>
+        <p:spPr/>
+      </p:sp>
+      <p:sp>
+        <p:nvSpPr>
+          <p:cNvPr id="3" name="Notes Placeholder 2"/>
+          <p:cNvSpPr>
+            <a:spLocks noGrp="1"/>
+          </p:cNvSpPr>
+          <p:nvPr>
+            <p:ph type="body" idx="1"/>
+          </p:nvPr>
+        </p:nvSpPr>
+        <p:spPr/>
+        <p:txBody>
+          <a:bodyPr/>
+          <a:lstStyle/>
+          <a:p>
+            <a:r>
+              <a:rPr lang="en-US" dirty="0"/>
               <a:t>Pollinator diversity is very low, with this patch favoring honeybees, large-bodied bees, and generalist flies</a:t>
             </a:r>
           </a:p>
@@ -743,7 +848,14 @@
             <a:pPr lvl="2"/>
             <a:r>
               <a:rPr lang="en-US" dirty="0"/>
-              <a:t>Develop a 3-year interval mowing protocol to maintain early successional meadow habitat</a:t>
+              <a:t>Develop a biyearly mowing protocol to maintain early successional meadow habitat. Once before the spring bloom in May and again in August after the flowering period</a:t>
+            </a:r>
+          </a:p>
+          <a:p>
+            <a:pPr lvl="2"/>
+            <a:r>
+              <a:rPr lang="en-US" dirty="0"/>
+              <a:t>Limit cover to &lt;30% for butterflies and ~50% for bees to promote their biodiversity</a:t>
             </a:r>
           </a:p>
           <a:p>
@@ -10607,7 +10719,7 @@
         </p:nvSpPr>
         <p:spPr>
           <a:xfrm>
-            <a:off x="-23184" y="5471712"/>
+            <a:off x="-39446" y="5720468"/>
             <a:ext cx="5284876" cy="1086237"/>
           </a:xfrm>
         </p:spPr>
@@ -10678,8 +10790,8 @@
         </p:nvSpPr>
         <p:spPr>
           <a:xfrm>
-            <a:off x="1648918" y="2567166"/>
-            <a:ext cx="4966252" cy="3170099"/>
+            <a:off x="1663748" y="2297158"/>
+            <a:ext cx="5576830" cy="3693319"/>
           </a:xfrm>
           <a:prstGeom prst="rect">
             <a:avLst/>
@@ -10723,14 +10835,64 @@
             <a:pPr marL="457200"/>
             <a:r>
               <a:rPr lang="en-US" sz="1600" dirty="0"/>
-              <a:t>About 1 in 4 species (~87 of 347 native bee species) are at risk of extinction</a:t>
+              <a:t>About 1 in 4 native bee species are at risk of extinction</a:t>
             </a:r>
           </a:p>
           <a:p>
             <a:pPr marL="457200"/>
             <a:r>
               <a:rPr lang="en-US" sz="1600" dirty="0"/>
-              <a:t>Leading causes include, agricultural intensification, habitat destruction, pesticide use, climate change, and urbanization</a:t>
+              <a:t>Leading causes</a:t>
+            </a:r>
+          </a:p>
+          <a:p>
+            <a:pPr marL="742950" indent="-285750">
+              <a:buFont typeface="Arial" panose="020B0604020202020204" pitchFamily="34" charset="0"/>
+              <a:buChar char="•"/>
+            </a:pPr>
+            <a:r>
+              <a:rPr lang="en-US" sz="1600" dirty="0"/>
+              <a:t>	Agricultural intensification</a:t>
+            </a:r>
+          </a:p>
+          <a:p>
+            <a:pPr marL="742950" indent="-285750">
+              <a:buFont typeface="Arial" panose="020B0604020202020204" pitchFamily="34" charset="0"/>
+              <a:buChar char="•"/>
+            </a:pPr>
+            <a:r>
+              <a:rPr lang="en-US" sz="1600" dirty="0"/>
+              <a:t>	Habitat destruction</a:t>
+            </a:r>
+          </a:p>
+          <a:p>
+            <a:pPr marL="742950" indent="-285750">
+              <a:buFont typeface="Arial" panose="020B0604020202020204" pitchFamily="34" charset="0"/>
+              <a:buChar char="•"/>
+            </a:pPr>
+            <a:r>
+              <a:rPr lang="en-US" sz="1600" dirty="0"/>
+              <a:t>	Pesticide use</a:t>
+            </a:r>
+          </a:p>
+          <a:p>
+            <a:pPr marL="742950" indent="-285750">
+              <a:buFont typeface="Arial" panose="020B0604020202020204" pitchFamily="34" charset="0"/>
+              <a:buChar char="•"/>
+            </a:pPr>
+            <a:r>
+              <a:rPr lang="en-US" sz="1600" dirty="0"/>
+              <a:t>	Climate change </a:t>
+            </a:r>
+          </a:p>
+          <a:p>
+            <a:pPr marL="742950" indent="-285750">
+              <a:buFont typeface="Arial" panose="020B0604020202020204" pitchFamily="34" charset="0"/>
+              <a:buChar char="•"/>
+            </a:pPr>
+            <a:r>
+              <a:rPr lang="en-US" sz="1600" dirty="0"/>
+              <a:t>	Urbanization</a:t>
             </a:r>
           </a:p>
           <a:p>
@@ -10856,23 +11018,56 @@
           <a:p>
             <a:r>
               <a:rPr lang="en-US" dirty="0"/>
-              <a:t>Surveys monitored pollinator visits to flowers along a four meter transect for two 10-minute intervals per observer</a:t>
-            </a:r>
-          </a:p>
-          <a:p>
+              <a:t>Survey</a:t>
+            </a:r>
+          </a:p>
+          <a:p>
+            <a:pPr lvl="1"/>
             <a:r>
               <a:rPr lang="en-US" dirty="0"/>
-              <a:t>Visit counts are based on number of flowers an individual pollinator visits</a:t>
-            </a:r>
-          </a:p>
-          <a:p>
+              <a:t>X2 observations per observer</a:t>
+            </a:r>
+          </a:p>
+          <a:p>
+            <a:pPr lvl="1"/>
             <a:r>
               <a:rPr lang="en-US" dirty="0"/>
-              <a:t>A total of 38 observations of 1136 pollination visits by Honeybees, Flies, Wasps, Bumble and Carpenter bees, Small bees, Small butterflies, Large butterflies, beetles, and ants</a:t>
-            </a:r>
-          </a:p>
-          <a:p>
+              <a:t>10-minute interval along one meter transect</a:t>
+            </a:r>
+          </a:p>
+          <a:p>
+            <a:pPr lvl="1"/>
+            <a:r>
+              <a:rPr lang="en-US" dirty="0"/>
+              <a:t>Visit count = pollinator flower visits</a:t>
+            </a:r>
+          </a:p>
+          <a:p>
+            <a:r>
+              <a:rPr lang="en-US" dirty="0"/>
+              <a:t>38 observations of 1136 flower visits of nine species types</a:t>
+            </a:r>
+          </a:p>
+          <a:p>
+            <a:pPr marL="0" indent="0">
+              <a:buNone/>
+            </a:pPr>
             <a:endParaRPr lang="en-US" dirty="0"/>
+          </a:p>
+          <a:p>
+            <a:pPr marL="0" indent="0">
+              <a:buNone/>
+            </a:pPr>
+            <a:r>
+              <a:rPr lang="en-US" sz="2800" dirty="0"/>
+              <a:t>Statistics</a:t>
+            </a:r>
+          </a:p>
+          <a:p>
+            <a:r>
+              <a:rPr lang="en-US" sz="1800" dirty="0"/>
+              <a:t>Shannon Diversity Index</a:t>
+            </a:r>
           </a:p>
         </p:txBody>
       </p:sp>
@@ -11097,7 +11292,7 @@
           <a:p>
             <a:r>
               <a:rPr lang="en-US" dirty="0"/>
-              <a:t>Reviewed plant-pollination symbiosis in </a:t>
+              <a:t>Reviewed plant-pollination interaction in </a:t>
             </a:r>
             <a:r>
               <a:rPr lang="en-US" i="1" dirty="0"/>
@@ -11108,66 +11303,90 @@
           <a:p>
             <a:pPr lvl="1"/>
             <a:r>
-              <a:rPr lang="en-US" dirty="0" err="1"/>
+              <a:rPr lang="en-US" sz="1800" dirty="0"/>
+              <a:t>Pollinators negatively affected </a:t>
+            </a:r>
+            <a:r>
+              <a:rPr lang="en-US" sz="1200" dirty="0" err="1"/>
               <a:t>Moroń</a:t>
             </a:r>
             <a:r>
+              <a:rPr lang="en-US" sz="1200" dirty="0"/>
+              <a:t> et al. 2009</a:t>
+            </a:r>
+            <a:r>
+              <a:rPr lang="en-US" sz="1200" i="1" dirty="0"/>
+              <a:t> </a:t>
+            </a:r>
+          </a:p>
+          <a:p>
+            <a:pPr lvl="1"/>
+            <a:r>
+              <a:rPr lang="en-US" sz="1800" dirty="0"/>
+              <a:t>Linear and non-linear effects </a:t>
+            </a:r>
+            <a:r>
+              <a:rPr lang="en-US" sz="1200" dirty="0" err="1"/>
+              <a:t>Moroń</a:t>
+            </a:r>
+            <a:r>
+              <a:rPr lang="en-US" sz="1200" dirty="0"/>
+              <a:t> et al. 2019</a:t>
+            </a:r>
+            <a:endParaRPr lang="en-US" sz="1200" i="1" dirty="0"/>
+          </a:p>
+          <a:p>
+            <a:pPr lvl="1"/>
+            <a:r>
+              <a:rPr lang="en-US" sz="1800" dirty="0"/>
+              <a:t>Invader-pollinator paradox </a:t>
+            </a:r>
+            <a:r>
+              <a:rPr lang="en-US" sz="1200" dirty="0" err="1"/>
+              <a:t>Moroń</a:t>
+            </a:r>
+            <a:r>
+              <a:rPr lang="en-US" sz="1200" dirty="0"/>
+              <a:t> et al. 2021</a:t>
+            </a:r>
+          </a:p>
+          <a:p>
+            <a:r>
               <a:rPr lang="en-US" dirty="0"/>
-              <a:t> et al. 2009</a:t>
-            </a:r>
-            <a:r>
-              <a:rPr lang="en-US" i="1" dirty="0"/>
-              <a:t> </a:t>
+              <a:t>Reviewed conservation protocol</a:t>
             </a:r>
           </a:p>
           <a:p>
             <a:pPr lvl="1"/>
             <a:r>
-              <a:rPr lang="en-US" dirty="0" err="1"/>
-              <a:t>Moroń</a:t>
-            </a:r>
-            <a:r>
-              <a:rPr lang="en-US" dirty="0"/>
-              <a:t> et al. 2019</a:t>
-            </a:r>
-            <a:endParaRPr lang="en-US" i="1" dirty="0"/>
+              <a:rPr lang="en-US" sz="1800" dirty="0"/>
+              <a:t>Managing for pollinator services vs pollinator diversity</a:t>
+            </a:r>
+            <a:r>
+              <a:rPr lang="en-US" sz="1200" dirty="0"/>
+              <a:t> 	</a:t>
+            </a:r>
+            <a:r>
+              <a:rPr lang="en-US" sz="1200" dirty="0" err="1"/>
+              <a:t>Senapathi</a:t>
+            </a:r>
+            <a:r>
+              <a:rPr lang="en-US" sz="1200" dirty="0"/>
+              <a:t> et al. 2015</a:t>
+            </a:r>
           </a:p>
           <a:p>
             <a:pPr lvl="1"/>
             <a:r>
-              <a:rPr lang="en-US" dirty="0" err="1"/>
-              <a:t>Moroń</a:t>
-            </a:r>
-            <a:r>
-              <a:rPr lang="en-US" dirty="0"/>
-              <a:t> et al. 2021</a:t>
-            </a:r>
-          </a:p>
-          <a:p>
-            <a:r>
-              <a:rPr lang="en-US" dirty="0"/>
-              <a:t>Reviewed conservation debate</a:t>
-            </a:r>
-          </a:p>
-          <a:p>
-            <a:pPr lvl="1"/>
-            <a:r>
-              <a:rPr lang="en-US" dirty="0" err="1"/>
-              <a:t>Senapathi</a:t>
-            </a:r>
-            <a:r>
-              <a:rPr lang="en-US" dirty="0"/>
-              <a:t> et al. 2015</a:t>
-            </a:r>
-          </a:p>
-          <a:p>
-            <a:pPr lvl="1"/>
-            <a:r>
-              <a:rPr lang="en-US" dirty="0" err="1"/>
+              <a:rPr lang="en-US" sz="1800" dirty="0"/>
+              <a:t>Conservation planning </a:t>
+            </a:r>
+            <a:r>
+              <a:rPr lang="en-US" sz="1200" dirty="0" err="1"/>
               <a:t>Mačić</a:t>
             </a:r>
             <a:r>
-              <a:rPr lang="en-US" dirty="0"/>
+              <a:rPr lang="en-US" sz="1200" dirty="0"/>
               <a:t> et al. 2018</a:t>
             </a:r>
           </a:p>
@@ -11709,13 +11928,13 @@
             <a:pPr lvl="1"/>
             <a:r>
               <a:rPr lang="en-US" dirty="0"/>
-              <a:t>Recent disturbance nearby is likely to decrease diversity further</a:t>
+              <a:t>Recent disturbance nearby</a:t>
             </a:r>
           </a:p>
           <a:p>
             <a:r>
               <a:rPr lang="en-US" dirty="0"/>
-              <a:t>Plant native pollinator garden</a:t>
+              <a:t>Plant native pollinator garden next to Apodaca</a:t>
             </a:r>
           </a:p>
           <a:p>
@@ -11729,7 +11948,14 @@
             <a:pPr lvl="1"/>
             <a:r>
               <a:rPr lang="en-US" dirty="0"/>
-              <a:t>3-year interval mowing management</a:t>
+              <a:t>Mow 2x per year</a:t>
+            </a:r>
+          </a:p>
+          <a:p>
+            <a:pPr lvl="1"/>
+            <a:r>
+              <a:rPr lang="en-US" dirty="0"/>
+              <a:t>Limit Cover</a:t>
             </a:r>
           </a:p>
         </p:txBody>
@@ -11902,7 +12128,12 @@
             <p:ph idx="1"/>
           </p:nvPr>
         </p:nvSpPr>
-        <p:spPr/>
+        <p:spPr>
+          <a:xfrm>
+            <a:off x="1390650" y="1638300"/>
+            <a:ext cx="9601200" cy="3581400"/>
+          </a:xfrm>
+        </p:spPr>
         <p:txBody>
           <a:bodyPr>
             <a:noAutofit/>
@@ -12896,7 +13127,18 @@
                 <a:ea typeface="Cambria" panose="02040503050406030204" pitchFamily="18" charset="0"/>
                 <a:cs typeface="Times New Roman" panose="02020603050405020304" pitchFamily="18" charset="0"/>
               </a:rPr>
-              <a:t>. Biological Invasions 21:947–960.</a:t>
+              <a:t>. Biological Invasions </a:t>
+            </a:r>
+            <a:r>
+              <a:rPr lang="en-US" sz="1400">
+                <a:solidFill>
+                  <a:schemeClr val="tx1"/>
+                </a:solidFill>
+                <a:effectLst/>
+                <a:ea typeface="Cambria" panose="02040503050406030204" pitchFamily="18" charset="0"/>
+                <a:cs typeface="Times New Roman" panose="02020603050405020304" pitchFamily="18" charset="0"/>
+              </a:rPr>
+              <a:t>21:947–960. </a:t>
             </a:r>
           </a:p>
           <a:p>
@@ -12909,57 +13151,7 @@
               </a:spcAft>
             </a:pPr>
             <a:r>
-              <a:rPr lang="en-US" sz="1400" dirty="0">
-                <a:solidFill>
-                  <a:schemeClr val="tx1"/>
-                </a:solidFill>
-                <a:effectLst/>
-                <a:ea typeface="Cambria" panose="02040503050406030204" pitchFamily="18" charset="0"/>
-                <a:cs typeface="Times New Roman" panose="02020603050405020304" pitchFamily="18" charset="0"/>
-              </a:rPr>
-              <a:t>NCSU. 2022. </a:t>
-            </a:r>
-            <a:r>
-              <a:rPr lang="en-US" sz="1400" dirty="0">
-                <a:solidFill>
-                  <a:schemeClr val="tx1"/>
-                </a:solidFill>
-                <a:effectLst/>
-                <a:ea typeface="Cambria" panose="02040503050406030204" pitchFamily="18" charset="0"/>
-                <a:cs typeface="Times New Roman" panose="02020603050405020304" pitchFamily="18" charset="0"/>
-                <a:hlinkClick r:id="rId6">
-                  <a:extLst>
-                    <a:ext uri="{A12FA001-AC4F-418D-AE19-62706E023703}">
-                      <ahyp:hlinkClr xmlns:ahyp="http://schemas.microsoft.com/office/drawing/2018/hyperlinkcolor" val="tx"/>
-                    </a:ext>
-                  </a:extLst>
-                </a:hlinkClick>
-              </a:rPr>
-              <a:t>Solidago (goldenrod, golden rod)</a:t>
-            </a:r>
-            <a:r>
-              <a:rPr lang="en-US" sz="1400" dirty="0">
-                <a:solidFill>
-                  <a:schemeClr val="tx1"/>
-                </a:solidFill>
-                <a:effectLst/>
-                <a:ea typeface="Cambria" panose="02040503050406030204" pitchFamily="18" charset="0"/>
-                <a:cs typeface="Times New Roman" panose="02020603050405020304" pitchFamily="18" charset="0"/>
-              </a:rPr>
-              <a:t>. Database.</a:t>
-            </a:r>
-          </a:p>
-          <a:p>
-            <a:pPr marL="0" marR="0">
-              <a:spcBef>
-                <a:spcPts val="0"/>
-              </a:spcBef>
-              <a:spcAft>
-                <a:spcPts val="1000"/>
-              </a:spcAft>
-            </a:pPr>
-            <a:r>
-              <a:rPr lang="en-US" sz="1400" dirty="0" err="1">
+              <a:rPr lang="en-US" sz="1400">
                 <a:solidFill>
                   <a:schemeClr val="tx1"/>
                 </a:solidFill>
@@ -13032,7 +13224,7 @@
                 <a:effectLst/>
                 <a:ea typeface="Cambria" panose="02040503050406030204" pitchFamily="18" charset="0"/>
                 <a:cs typeface="Times New Roman" panose="02020603050405020304" pitchFamily="18" charset="0"/>
-                <a:hlinkClick r:id="rId7">
+                <a:hlinkClick r:id="rId6">
                   <a:extLst>
                     <a:ext uri="{A12FA001-AC4F-418D-AE19-62706E023703}">
                       <ahyp:hlinkClr xmlns:ahyp="http://schemas.microsoft.com/office/drawing/2018/hyperlinkcolor" val="tx"/>
@@ -13946,34 +14138,6 @@
 </file>
 
 <file path=customXml/item1.xml><?xml version="1.0" encoding="utf-8"?>
-<?mso-contentType ?>
-<FormTemplates xmlns="http://schemas.microsoft.com/sharepoint/v3/contenttype/forms">
-  <Display>DocumentLibraryForm</Display>
-  <Edit>DocumentLibraryForm</Edit>
-  <New>DocumentLibraryForm</New>
-</FormTemplates>
-</file>
-
-<file path=customXml/item2.xml><?xml version="1.0" encoding="utf-8"?>
-<p:properties xmlns:p="http://schemas.microsoft.com/office/2006/metadata/properties" xmlns:xsi="http://www.w3.org/2001/XMLSchema-instance" xmlns:pc="http://schemas.microsoft.com/office/infopath/2007/PartnerControls">
-  <documentManagement>
-    <_ip_UnifiedCompliancePolicyUIAction xmlns="http://schemas.microsoft.com/sharepoint/v3" xsi:nil="true"/>
-    <Image xmlns="71af3243-3dd4-4a8d-8c0d-dd76da1f02a5">
-      <Url xsi:nil="true"/>
-      <Description xsi:nil="true"/>
-    </Image>
-    <Status xmlns="71af3243-3dd4-4a8d-8c0d-dd76da1f02a5">Not started</Status>
-    <_ip_UnifiedCompliancePolicyProperties xmlns="http://schemas.microsoft.com/sharepoint/v3" xsi:nil="true"/>
-    <ImageTagsTaxHTField xmlns="71af3243-3dd4-4a8d-8c0d-dd76da1f02a5">
-      <Terms xmlns="http://schemas.microsoft.com/office/infopath/2007/PartnerControls"/>
-    </ImageTagsTaxHTField>
-    <TaxCatchAll xmlns="230e9df3-be65-4c73-a93b-d1236ebd677e"/>
-    <MediaServiceKeyPoints xmlns="71af3243-3dd4-4a8d-8c0d-dd76da1f02a5" xsi:nil="true"/>
-  </documentManagement>
-</p:properties>
-</file>
-
-<file path=customXml/item3.xml><?xml version="1.0" encoding="utf-8"?>
 <ct:contentTypeSchema xmlns:ct="http://schemas.microsoft.com/office/2006/metadata/contentType" xmlns:ma="http://schemas.microsoft.com/office/2006/metadata/properties/metaAttributes" ct:_="" ma:_="" ma:contentTypeName="Document" ma:contentTypeID="0x01010079F111ED35F8CC479449609E8A0923A6" ma:contentTypeVersion="20" ma:contentTypeDescription="Create a new document." ma:contentTypeScope="" ma:versionID="1267097ee5f5874adfcc408041ae252e">
   <xsd:schema xmlns:xsd="http://www.w3.org/2001/XMLSchema" xmlns:xs="http://www.w3.org/2001/XMLSchema" xmlns:p="http://schemas.microsoft.com/office/2006/metadata/properties" xmlns:ns1="http://schemas.microsoft.com/sharepoint/v3" xmlns:ns2="71af3243-3dd4-4a8d-8c0d-dd76da1f02a5" xmlns:ns3="16c05727-aa75-4e4a-9b5f-8a80a1165891" xmlns:ns4="230e9df3-be65-4c73-a93b-d1236ebd677e" targetNamespace="http://schemas.microsoft.com/office/2006/metadata/properties" ma:root="true" ma:fieldsID="395891a93df65b14727750f2c06c306c" ns1:_="" ns2:_="" ns3:_="" ns4:_="">
     <xsd:import namespace="http://schemas.microsoft.com/sharepoint/v3"/>
@@ -14249,27 +14413,35 @@
 </ct:contentTypeSchema>
 </file>
 
-<file path=customXml/itemProps1.xml><?xml version="1.0" encoding="utf-8"?>
-<ds:datastoreItem xmlns:ds="http://schemas.openxmlformats.org/officeDocument/2006/customXml" ds:itemID="{0FD6FE22-81A0-4500-AFD0-342D21BB9A2C}">
-  <ds:schemaRefs>
-    <ds:schemaRef ds:uri="http://schemas.microsoft.com/sharepoint/v3/contenttype/forms"/>
-  </ds:schemaRefs>
-</ds:datastoreItem>
+<file path=customXml/item2.xml><?xml version="1.0" encoding="utf-8"?>
+<p:properties xmlns:p="http://schemas.microsoft.com/office/2006/metadata/properties" xmlns:xsi="http://www.w3.org/2001/XMLSchema-instance" xmlns:pc="http://schemas.microsoft.com/office/infopath/2007/PartnerControls">
+  <documentManagement>
+    <_ip_UnifiedCompliancePolicyUIAction xmlns="http://schemas.microsoft.com/sharepoint/v3" xsi:nil="true"/>
+    <Image xmlns="71af3243-3dd4-4a8d-8c0d-dd76da1f02a5">
+      <Url xsi:nil="true"/>
+      <Description xsi:nil="true"/>
+    </Image>
+    <Status xmlns="71af3243-3dd4-4a8d-8c0d-dd76da1f02a5">Not started</Status>
+    <_ip_UnifiedCompliancePolicyProperties xmlns="http://schemas.microsoft.com/sharepoint/v3" xsi:nil="true"/>
+    <ImageTagsTaxHTField xmlns="71af3243-3dd4-4a8d-8c0d-dd76da1f02a5">
+      <Terms xmlns="http://schemas.microsoft.com/office/infopath/2007/PartnerControls"/>
+    </ImageTagsTaxHTField>
+    <TaxCatchAll xmlns="230e9df3-be65-4c73-a93b-d1236ebd677e"/>
+    <MediaServiceKeyPoints xmlns="71af3243-3dd4-4a8d-8c0d-dd76da1f02a5" xsi:nil="true"/>
+  </documentManagement>
+</p:properties>
 </file>
 
-<file path=customXml/itemProps2.xml><?xml version="1.0" encoding="utf-8"?>
-<ds:datastoreItem xmlns:ds="http://schemas.openxmlformats.org/officeDocument/2006/customXml" ds:itemID="{29C43685-694E-4579-B109-3C418D49DA65}">
-  <ds:schemaRefs>
-    <ds:schemaRef ds:uri="http://schemas.microsoft.com/office/2006/metadata/properties"/>
-    <ds:schemaRef ds:uri="http://schemas.microsoft.com/office/infopath/2007/PartnerControls"/>
-    <ds:schemaRef ds:uri="http://schemas.microsoft.com/sharepoint/v3"/>
-    <ds:schemaRef ds:uri="71af3243-3dd4-4a8d-8c0d-dd76da1f02a5"/>
-    <ds:schemaRef ds:uri="230e9df3-be65-4c73-a93b-d1236ebd677e"/>
-  </ds:schemaRefs>
-</ds:datastoreItem>
+<file path=customXml/item3.xml><?xml version="1.0" encoding="utf-8"?>
+<?mso-contentType ?>
+<FormTemplates xmlns="http://schemas.microsoft.com/sharepoint/v3/contenttype/forms">
+  <Display>DocumentLibraryForm</Display>
+  <Edit>DocumentLibraryForm</Edit>
+  <New>DocumentLibraryForm</New>
+</FormTemplates>
 </file>
 
-<file path=customXml/itemProps3.xml><?xml version="1.0" encoding="utf-8"?>
+<file path=customXml/itemProps1.xml><?xml version="1.0" encoding="utf-8"?>
 <ds:datastoreItem xmlns:ds="http://schemas.openxmlformats.org/officeDocument/2006/customXml" ds:itemID="{CC96B61E-1B64-430F-934F-7D1B90028029}">
   <ds:schemaRefs>
     <ds:schemaRef ds:uri="http://schemas.microsoft.com/office/2006/metadata/contentType"/>
@@ -14290,6 +14462,26 @@
 </ds:datastoreItem>
 </file>
 
+<file path=customXml/itemProps2.xml><?xml version="1.0" encoding="utf-8"?>
+<ds:datastoreItem xmlns:ds="http://schemas.openxmlformats.org/officeDocument/2006/customXml" ds:itemID="{29C43685-694E-4579-B109-3C418D49DA65}">
+  <ds:schemaRefs>
+    <ds:schemaRef ds:uri="http://schemas.microsoft.com/office/2006/metadata/properties"/>
+    <ds:schemaRef ds:uri="http://schemas.microsoft.com/office/infopath/2007/PartnerControls"/>
+    <ds:schemaRef ds:uri="http://schemas.microsoft.com/sharepoint/v3"/>
+    <ds:schemaRef ds:uri="71af3243-3dd4-4a8d-8c0d-dd76da1f02a5"/>
+    <ds:schemaRef ds:uri="230e9df3-be65-4c73-a93b-d1236ebd677e"/>
+  </ds:schemaRefs>
+</ds:datastoreItem>
+</file>
+
+<file path=customXml/itemProps3.xml><?xml version="1.0" encoding="utf-8"?>
+<ds:datastoreItem xmlns:ds="http://schemas.openxmlformats.org/officeDocument/2006/customXml" ds:itemID="{0FD6FE22-81A0-4500-AFD0-342D21BB9A2C}">
+  <ds:schemaRefs>
+    <ds:schemaRef ds:uri="http://schemas.microsoft.com/sharepoint/v3/contenttype/forms"/>
+  </ds:schemaRefs>
+</ds:datastoreItem>
+</file>
+
 <file path=docMetadata/LabelInfo.xml><?xml version="1.0" encoding="utf-8"?>
 <clbl:labelList xmlns:clbl="http://schemas.microsoft.com/office/2020/mipLabelMetadata">
   <clbl:label id="{f42aa342-8706-4288-bd11-ebb85995028c}" enabled="1" method="Standard" siteId="{72f988bf-86f1-41af-91ab-2d7cd011db47}" removed="0"/>

</xml_diff>